<commit_message>
update ptt e icono play
</commit_message>
<xml_diff>
--- a/SyL - Shodan.pptx
+++ b/SyL - Shodan.pptx
@@ -5,20 +5,22 @@
     <p:sldMasterId id="2147483648" r:id="rId2"/>
   </p:sldMasterIdLst>
   <p:notesMasterIdLst>
-    <p:notesMasterId r:id="rId11"/>
+    <p:notesMasterId r:id="rId13"/>
   </p:notesMasterIdLst>
   <p:handoutMasterIdLst>
-    <p:handoutMasterId r:id="rId12"/>
+    <p:handoutMasterId r:id="rId14"/>
   </p:handoutMasterIdLst>
   <p:sldIdLst>
     <p:sldId id="256" r:id="rId3"/>
     <p:sldId id="262" r:id="rId4"/>
-    <p:sldId id="258" r:id="rId5"/>
-    <p:sldId id="263" r:id="rId6"/>
-    <p:sldId id="266" r:id="rId7"/>
-    <p:sldId id="267" r:id="rId8"/>
-    <p:sldId id="265" r:id="rId9"/>
-    <p:sldId id="260" r:id="rId10"/>
+    <p:sldId id="268" r:id="rId5"/>
+    <p:sldId id="258" r:id="rId6"/>
+    <p:sldId id="263" r:id="rId7"/>
+    <p:sldId id="266" r:id="rId8"/>
+    <p:sldId id="267" r:id="rId9"/>
+    <p:sldId id="265" r:id="rId10"/>
+    <p:sldId id="269" r:id="rId11"/>
+    <p:sldId id="260" r:id="rId12"/>
   </p:sldIdLst>
   <p:sldSz cx="12192000" cy="6858000"/>
   <p:notesSz cx="6858000" cy="9144000"/>
@@ -861,69 +863,148 @@
           <a:bodyPr/>
           <a:lstStyle/>
           <a:p>
-            <a:r>
-              <a:rPr lang="es-ES" dirty="0"/>
-              <a:t>-Es un motor de búsqueda</a:t>
+            <a:pPr marL="514350" indent="-514350">
+              <a:spcBef>
+                <a:spcPts val="1000"/>
+              </a:spcBef>
+              <a:buClr>
+                <a:schemeClr val="accent1"/>
+              </a:buClr>
+              <a:buSzPct val="80000"/>
+              <a:buFont typeface="+mj-lt"/>
+              <a:buAutoNum type="arabicPeriod"/>
+            </a:pPr>
+            <a:r>
+              <a:rPr lang="es-ES" sz="1200" b="1" dirty="0"/>
+              <a:t>Qué es</a:t>
+            </a:r>
+          </a:p>
+          <a:p>
+            <a:pPr marL="514350" indent="-514350">
+              <a:spcBef>
+                <a:spcPts val="1000"/>
+              </a:spcBef>
+              <a:buClr>
+                <a:schemeClr val="accent1"/>
+              </a:buClr>
+              <a:buSzPct val="80000"/>
+              <a:buFont typeface="+mj-lt"/>
+              <a:buAutoNum type="arabicPeriod"/>
+            </a:pPr>
+            <a:r>
+              <a:rPr lang="es-ES" sz="1200" b="1" dirty="0"/>
+              <a:t>Cómo funciona</a:t>
+            </a:r>
+          </a:p>
+          <a:p>
+            <a:pPr marL="514350" indent="-514350">
+              <a:spcBef>
+                <a:spcPts val="1000"/>
+              </a:spcBef>
+              <a:buClr>
+                <a:schemeClr val="accent1"/>
+              </a:buClr>
+              <a:buSzPct val="80000"/>
+              <a:buFont typeface="+mj-lt"/>
+              <a:buAutoNum type="arabicPeriod"/>
+            </a:pPr>
+            <a:r>
+              <a:rPr lang="es-ES" sz="1200" b="1" dirty="0"/>
+              <a:t>Qué ofrece</a:t>
+            </a:r>
+          </a:p>
+          <a:p>
+            <a:pPr marL="514350" indent="-514350">
+              <a:spcBef>
+                <a:spcPts val="1000"/>
+              </a:spcBef>
+              <a:buClr>
+                <a:schemeClr val="accent1"/>
+              </a:buClr>
+              <a:buSzPct val="80000"/>
+              <a:buFont typeface="+mj-lt"/>
+              <a:buAutoNum type="arabicPeriod" startAt="4"/>
+            </a:pPr>
+            <a:r>
+              <a:rPr lang="en-US" sz="2800" b="1" dirty="0" err="1"/>
+              <a:t>Demostración</a:t>
+            </a:r>
+            <a:r>
+              <a:rPr lang="en-US" sz="2800" b="1" dirty="0"/>
+              <a:t> </a:t>
+            </a:r>
+            <a:r>
+              <a:rPr lang="en-US" sz="2800" b="1" dirty="0" err="1"/>
+              <a:t>práctica</a:t>
+            </a:r>
+            <a:r>
+              <a:rPr lang="en-US" sz="2800" dirty="0"/>
+              <a:t>: </a:t>
+            </a:r>
+          </a:p>
+          <a:p>
+            <a:pPr lvl="1">
+              <a:spcBef>
+                <a:spcPts val="1000"/>
+              </a:spcBef>
+              <a:buClr>
+                <a:schemeClr val="accent1"/>
+              </a:buClr>
+              <a:buSzPct val="80000"/>
+            </a:pPr>
+            <a:r>
+              <a:rPr lang="en-US" sz="2800" dirty="0" err="1"/>
+              <a:t>Uso</a:t>
+            </a:r>
+            <a:r>
+              <a:rPr lang="en-US" sz="2800" dirty="0"/>
+              <a:t> web y de la API</a:t>
+            </a:r>
+          </a:p>
+          <a:p>
+            <a:pPr marL="514350" indent="-514350">
+              <a:spcBef>
+                <a:spcPts val="1000"/>
+              </a:spcBef>
+              <a:buClr>
+                <a:schemeClr val="accent1"/>
+              </a:buClr>
+              <a:buSzPct val="80000"/>
+              <a:buFont typeface="+mj-lt"/>
+              <a:buAutoNum type="arabicPeriod" startAt="4"/>
+            </a:pPr>
+            <a:r>
+              <a:rPr lang="en-US" sz="2800" b="1" dirty="0" err="1"/>
+              <a:t>Conclusiones</a:t>
+            </a:r>
+            <a:endParaRPr lang="en-US" sz="2800" b="1" dirty="0"/>
+          </a:p>
+          <a:p>
+            <a:pPr marL="514350" indent="-514350">
+              <a:spcBef>
+                <a:spcPts val="1000"/>
+              </a:spcBef>
+              <a:buClr>
+                <a:schemeClr val="accent1"/>
+              </a:buClr>
+              <a:buSzPct val="80000"/>
+              <a:buFont typeface="+mj-lt"/>
+              <a:buAutoNum type="arabicPeriod" startAt="4"/>
+            </a:pPr>
+            <a:r>
+              <a:rPr lang="en-US" sz="2800" b="1" dirty="0" err="1"/>
+              <a:t>Referencias</a:t>
+            </a:r>
+            <a:r>
+              <a:rPr lang="en-US" sz="2800" b="1" dirty="0"/>
+              <a:t>*</a:t>
             </a:r>
           </a:p>
           <a:p>
             <a:endParaRPr lang="es-ES" dirty="0"/>
           </a:p>
           <a:p>
-            <a:r>
-              <a:rPr lang="es-ES" dirty="0"/>
-              <a:t>-Otros motores de búsqueda como Google, </a:t>
-            </a:r>
-            <a:r>
-              <a:rPr lang="es-ES" dirty="0" err="1"/>
-              <a:t>DuckDuckGo</a:t>
-            </a:r>
-            <a:r>
-              <a:rPr lang="es-ES" dirty="0"/>
-              <a:t> o Bing indexan sitios web, este dispositivos: servidores, </a:t>
-            </a:r>
-            <a:r>
-              <a:rPr lang="es-ES" dirty="0" err="1"/>
-              <a:t>routers</a:t>
-            </a:r>
-            <a:r>
-              <a:rPr lang="es-ES" dirty="0"/>
-              <a:t>, maquinas, todo lo que tenga una </a:t>
-            </a:r>
-            <a:r>
-              <a:rPr lang="es-ES" dirty="0" err="1"/>
-              <a:t>ip</a:t>
-            </a:r>
-            <a:r>
-              <a:rPr lang="es-ES" dirty="0"/>
-              <a:t> publica</a:t>
-            </a:r>
-          </a:p>
-          <a:p>
             <a:endParaRPr lang="es-ES" dirty="0"/>
-          </a:p>
-          <a:p>
-            <a:r>
-              <a:rPr lang="es-ES" dirty="0"/>
-              <a:t>-Por el crecimiento exponencial de los dispositivos conectados, esta es una herramienta clave</a:t>
-            </a:r>
-          </a:p>
-          <a:p>
-            <a:endParaRPr lang="es-ES" dirty="0"/>
-          </a:p>
-          <a:p>
-            <a:r>
-              <a:rPr lang="es-ES" dirty="0"/>
-              <a:t>-Suizo que estudio en la </a:t>
-            </a:r>
-            <a:r>
-              <a:rPr lang="es-ES" dirty="0" err="1"/>
-              <a:t>univ</a:t>
-            </a:r>
-            <a:r>
-              <a:rPr lang="es-ES" dirty="0"/>
-              <a:t> de California, tuvo otros proyectos, pero no con tanta repercusión.</a:t>
-            </a:r>
           </a:p>
         </p:txBody>
       </p:sp>
@@ -1047,23 +1128,40 @@
           <a:p>
             <a:r>
               <a:rPr lang="es-ES" dirty="0"/>
-              <a:t>-</a:t>
+              <a:t>-Es un motor de búsqueda</a:t>
+            </a:r>
+          </a:p>
+          <a:p>
+            <a:endParaRPr lang="es-ES" dirty="0"/>
+          </a:p>
+          <a:p>
+            <a:r>
+              <a:rPr lang="es-ES" dirty="0"/>
+              <a:t>-Otros motores de búsqueda como Google, </a:t>
             </a:r>
             <a:r>
               <a:rPr lang="es-ES" dirty="0" err="1"/>
-              <a:t>Crawling</a:t>
+              <a:t>DuckDuckGo</a:t>
             </a:r>
             <a:r>
               <a:rPr lang="es-ES" dirty="0"/>
-              <a:t> es la indexación por medio de </a:t>
+              <a:t> o Bing indexan sitios web, este dispositivos: servidores, </a:t>
             </a:r>
             <a:r>
               <a:rPr lang="es-ES" dirty="0" err="1"/>
-              <a:t>bots</a:t>
+              <a:t>routers</a:t>
             </a:r>
             <a:r>
               <a:rPr lang="es-ES" dirty="0"/>
-              <a:t>, al igual que hacen otros buscadores</a:t>
+              <a:t>, maquinas, todo lo que tenga una </a:t>
+            </a:r>
+            <a:r>
+              <a:rPr lang="es-ES" dirty="0" err="1"/>
+              <a:t>ip</a:t>
+            </a:r>
+            <a:r>
+              <a:rPr lang="es-ES" dirty="0"/>
+              <a:t> publica</a:t>
             </a:r>
           </a:p>
           <a:p>
@@ -1072,30 +1170,24 @@
           <a:p>
             <a:r>
               <a:rPr lang="es-ES" dirty="0"/>
-              <a:t>-Recopila todos los servicios que expone el dispositivo </a:t>
-            </a:r>
+              <a:t>-Por el crecimiento exponencial de los dispositivos conectados, esta es una herramienta clave</a:t>
+            </a:r>
+          </a:p>
+          <a:p>
+            <a:endParaRPr lang="es-ES" dirty="0"/>
           </a:p>
           <a:p>
             <a:r>
               <a:rPr lang="es-ES" dirty="0"/>
-              <a:t>	Banner </a:t>
+              <a:t>-Suizo que estudio en la </a:t>
             </a:r>
             <a:r>
               <a:rPr lang="es-ES" dirty="0" err="1"/>
-              <a:t>grabbing</a:t>
+              <a:t>univ</a:t>
             </a:r>
             <a:r>
               <a:rPr lang="es-ES" dirty="0"/>
-              <a:t>: información expuesta por el servicio</a:t>
-            </a:r>
-          </a:p>
-          <a:p>
-            <a:endParaRPr lang="es-ES" dirty="0"/>
-          </a:p>
-          <a:p>
-            <a:r>
-              <a:rPr lang="es-ES" dirty="0"/>
-              <a:t>-Nos permite acceder, filtrar y explotar esta información </a:t>
+              <a:t> de California, tuvo otros proyectos, pero no con tanta repercusión.</a:t>
             </a:r>
           </a:p>
         </p:txBody>
@@ -1164,7 +1256,7 @@
     </p:spTree>
     <p:extLst>
       <p:ext uri="{BB962C8B-B14F-4D97-AF65-F5344CB8AC3E}">
-        <p14:creationId xmlns:p14="http://schemas.microsoft.com/office/powerpoint/2010/main" val="2505227912"/>
+        <p14:creationId xmlns:p14="http://schemas.microsoft.com/office/powerpoint/2010/main" val="760432315"/>
       </p:ext>
     </p:extLst>
   </p:cSld>
@@ -1220,7 +1312,23 @@
           <a:p>
             <a:r>
               <a:rPr lang="es-ES" dirty="0"/>
-              <a:t>Al terminar,</a:t>
+              <a:t>-</a:t>
+            </a:r>
+            <a:r>
+              <a:rPr lang="es-ES" dirty="0" err="1"/>
+              <a:t>Crawling</a:t>
+            </a:r>
+            <a:r>
+              <a:rPr lang="es-ES" dirty="0"/>
+              <a:t> es la indexación por medio de </a:t>
+            </a:r>
+            <a:r>
+              <a:rPr lang="es-ES" dirty="0" err="1"/>
+              <a:t>bots</a:t>
+            </a:r>
+            <a:r>
+              <a:rPr lang="es-ES" dirty="0"/>
+              <a:t>, al igual que hacen otros buscadores</a:t>
             </a:r>
           </a:p>
           <a:p>
@@ -1229,7 +1337,30 @@
           <a:p>
             <a:r>
               <a:rPr lang="es-ES" dirty="0"/>
-              <a:t>A CONTINUACIÓN OS VOY A REALIZAR UNA DEMOSTRACIÓN DE SU USO POR MEDIO DE LA WEB, DE LA LINEA COMANDO Y DE LA API POR MEDIO DE UNA PRUEBA DE CONCEPTO QUE HE SARROLLADO PARA ESTE TRABAJO</a:t>
+              <a:t>-Recopila todos los servicios que expone el dispositivo </a:t>
+            </a:r>
+          </a:p>
+          <a:p>
+            <a:r>
+              <a:rPr lang="es-ES" dirty="0"/>
+              <a:t>	Banner </a:t>
+            </a:r>
+            <a:r>
+              <a:rPr lang="es-ES" dirty="0" err="1"/>
+              <a:t>grabbing</a:t>
+            </a:r>
+            <a:r>
+              <a:rPr lang="es-ES" dirty="0"/>
+              <a:t>: información expuesta por el servicio</a:t>
+            </a:r>
+          </a:p>
+          <a:p>
+            <a:endParaRPr lang="es-ES" dirty="0"/>
+          </a:p>
+          <a:p>
+            <a:r>
+              <a:rPr lang="es-ES" dirty="0"/>
+              <a:t>-Nos permite acceder, filtrar y explotar esta información </a:t>
             </a:r>
           </a:p>
         </p:txBody>
@@ -1298,7 +1429,7 @@
     </p:spTree>
     <p:extLst>
       <p:ext uri="{BB962C8B-B14F-4D97-AF65-F5344CB8AC3E}">
-        <p14:creationId xmlns:p14="http://schemas.microsoft.com/office/powerpoint/2010/main" val="3477791921"/>
+        <p14:creationId xmlns:p14="http://schemas.microsoft.com/office/powerpoint/2010/main" val="2505227912"/>
       </p:ext>
     </p:extLst>
   </p:cSld>
@@ -1352,7 +1483,19 @@
           <a:bodyPr/>
           <a:lstStyle/>
           <a:p>
-            <a:endParaRPr lang="es-ES"/>
+            <a:r>
+              <a:rPr lang="es-ES" dirty="0"/>
+              <a:t>Al terminar,</a:t>
+            </a:r>
+          </a:p>
+          <a:p>
+            <a:endParaRPr lang="es-ES" dirty="0"/>
+          </a:p>
+          <a:p>
+            <a:r>
+              <a:rPr lang="es-ES" dirty="0"/>
+              <a:t>A CONTINUACIÓN OS VOY A REALIZAR UNA DEMOSTRACIÓN DE SU USO POR MEDIO DE LA WEB, DE LA LINEA COMANDO Y DE LA API POR MEDIO DE UNA PRUEBA DE CONCEPTO QUE HE SARROLLADO PARA ESTE TRABAJO</a:t>
+            </a:r>
           </a:p>
         </p:txBody>
       </p:sp>
@@ -1420,7 +1563,7 @@
     </p:spTree>
     <p:extLst>
       <p:ext uri="{BB962C8B-B14F-4D97-AF65-F5344CB8AC3E}">
-        <p14:creationId xmlns:p14="http://schemas.microsoft.com/office/powerpoint/2010/main" val="955731065"/>
+        <p14:creationId xmlns:p14="http://schemas.microsoft.com/office/powerpoint/2010/main" val="3477791921"/>
       </p:ext>
     </p:extLst>
   </p:cSld>
@@ -1474,158 +1617,7 @@
           <a:bodyPr/>
           <a:lstStyle/>
           <a:p>
-            <a:r>
-              <a:rPr lang="es-ES" dirty="0"/>
-              <a:t>LA eh desarrollado en </a:t>
-            </a:r>
-            <a:r>
-              <a:rPr lang="es-ES" dirty="0" err="1"/>
-              <a:t>node</a:t>
-            </a:r>
-            <a:r>
-              <a:rPr lang="es-ES" dirty="0"/>
-              <a:t> JS</a:t>
-            </a:r>
-          </a:p>
-          <a:p>
-            <a:endParaRPr lang="es-ES" dirty="0"/>
-          </a:p>
-          <a:p>
-            <a:r>
-              <a:rPr lang="es-ES" dirty="0"/>
-              <a:t>La idea del desarrollo se basa en poder explotar toda la información que nos ofrece </a:t>
-            </a:r>
-            <a:r>
-              <a:rPr lang="es-ES" dirty="0" err="1"/>
-              <a:t>shodan</a:t>
-            </a:r>
-            <a:r>
-              <a:rPr lang="es-ES" dirty="0"/>
-              <a:t>.</a:t>
-            </a:r>
-          </a:p>
-          <a:p>
-            <a:endParaRPr lang="es-ES" dirty="0"/>
-          </a:p>
-          <a:p>
-            <a:r>
-              <a:rPr lang="es-ES" dirty="0"/>
-              <a:t>El objetivo consiste en buscar todos los dispositivos con un </a:t>
-            </a:r>
-            <a:r>
-              <a:rPr lang="es-ES" dirty="0" err="1"/>
-              <a:t>login</a:t>
-            </a:r>
-            <a:r>
-              <a:rPr lang="es-ES" dirty="0"/>
-              <a:t> web de administración, por lo general de </a:t>
-            </a:r>
-            <a:r>
-              <a:rPr lang="es-ES" dirty="0" err="1"/>
-              <a:t>routers</a:t>
-            </a:r>
-            <a:r>
-              <a:rPr lang="es-ES" dirty="0"/>
-              <a:t>.</a:t>
-            </a:r>
-          </a:p>
-          <a:p>
-            <a:endParaRPr lang="es-ES" dirty="0"/>
-          </a:p>
-          <a:p>
-            <a:r>
-              <a:rPr lang="es-ES" dirty="0"/>
-              <a:t>De esta manera podríamos comprobar si para alguno de ellos se sigue usando las credenciales por defecto. Trabajo tedioso.</a:t>
-            </a:r>
-          </a:p>
-          <a:p>
-            <a:r>
-              <a:rPr lang="es-ES" dirty="0"/>
-              <a:t>[</a:t>
-            </a:r>
-            <a:r>
-              <a:rPr lang="es-ES" dirty="0" err="1"/>
-              <a:t>disclaimer</a:t>
-            </a:r>
-            <a:r>
-              <a:rPr lang="es-ES" dirty="0"/>
-              <a:t>]</a:t>
-            </a:r>
-          </a:p>
-          <a:p>
-            <a:endParaRPr lang="es-ES" dirty="0"/>
-          </a:p>
-          <a:p>
-            <a:r>
-              <a:rPr lang="es-ES" dirty="0"/>
-              <a:t>Para eso: Automatizar la comprobación de credenciales. Emulando ser un navegador, (mediante web </a:t>
-            </a:r>
-            <a:r>
-              <a:rPr lang="es-ES" dirty="0" err="1"/>
-              <a:t>scrapping</a:t>
-            </a:r>
-            <a:r>
-              <a:rPr lang="es-ES" dirty="0"/>
-              <a:t> me fue técnicamente imposible)</a:t>
-            </a:r>
-          </a:p>
-          <a:p>
-            <a:endParaRPr lang="es-ES" dirty="0"/>
-          </a:p>
-          <a:p>
-            <a:r>
-              <a:rPr lang="es-ES" dirty="0"/>
-              <a:t>Por ultimo, visualizar la información </a:t>
-            </a:r>
-            <a:r>
-              <a:rPr lang="es-ES" dirty="0" err="1"/>
-              <a:t>rcopilada</a:t>
-            </a:r>
-            <a:r>
-              <a:rPr lang="es-ES" dirty="0"/>
-              <a:t> y procesada por mi aplicación.</a:t>
-            </a:r>
-          </a:p>
-          <a:p>
-            <a:endParaRPr lang="es-ES" dirty="0"/>
-          </a:p>
-          <a:p>
-            <a:r>
-              <a:rPr lang="es-ES" dirty="0"/>
-              <a:t>Para todo esto: he decidido basarme en la interfaz grafica LUCI de </a:t>
-            </a:r>
-            <a:r>
-              <a:rPr lang="es-ES" dirty="0" err="1"/>
-              <a:t>openwrt</a:t>
-            </a:r>
-            <a:r>
-              <a:rPr lang="es-ES" dirty="0"/>
-              <a:t>, que usamos a lo largo del curso en nuestra ci40</a:t>
-            </a:r>
-          </a:p>
-          <a:p>
-            <a:r>
-              <a:rPr lang="es-ES" dirty="0"/>
-              <a:t>Utilizando mi dispositivo para no infringir ninguna ley.</a:t>
-            </a:r>
-          </a:p>
-          <a:p>
-            <a:endParaRPr lang="es-ES" dirty="0"/>
-          </a:p>
-          <a:p>
-            <a:r>
-              <a:rPr lang="es-ES" dirty="0"/>
-              <a:t>Vamos con la demo!</a:t>
-            </a:r>
-          </a:p>
-          <a:p>
-            <a:endParaRPr lang="es-ES" dirty="0"/>
-          </a:p>
-          <a:p>
-            <a:endParaRPr lang="es-ES" dirty="0"/>
-          </a:p>
-          <a:p>
-            <a:endParaRPr lang="es-ES" dirty="0"/>
+            <a:endParaRPr lang="es-ES"/>
           </a:p>
         </p:txBody>
       </p:sp>
@@ -1693,7 +1685,7 @@
     </p:spTree>
     <p:extLst>
       <p:ext uri="{BB962C8B-B14F-4D97-AF65-F5344CB8AC3E}">
-        <p14:creationId xmlns:p14="http://schemas.microsoft.com/office/powerpoint/2010/main" val="1479877958"/>
+        <p14:creationId xmlns:p14="http://schemas.microsoft.com/office/powerpoint/2010/main" val="955731065"/>
       </p:ext>
     </p:extLst>
   </p:cSld>
@@ -1747,7 +1739,158 @@
           <a:bodyPr/>
           <a:lstStyle/>
           <a:p>
-            <a:endParaRPr lang="es-ES"/>
+            <a:r>
+              <a:rPr lang="es-ES" dirty="0"/>
+              <a:t>LA eh desarrollado en </a:t>
+            </a:r>
+            <a:r>
+              <a:rPr lang="es-ES" dirty="0" err="1"/>
+              <a:t>node</a:t>
+            </a:r>
+            <a:r>
+              <a:rPr lang="es-ES" dirty="0"/>
+              <a:t> JS</a:t>
+            </a:r>
+          </a:p>
+          <a:p>
+            <a:endParaRPr lang="es-ES" dirty="0"/>
+          </a:p>
+          <a:p>
+            <a:r>
+              <a:rPr lang="es-ES" dirty="0"/>
+              <a:t>La idea del desarrollo se basa en poder explotar toda la información que nos ofrece </a:t>
+            </a:r>
+            <a:r>
+              <a:rPr lang="es-ES" dirty="0" err="1"/>
+              <a:t>shodan</a:t>
+            </a:r>
+            <a:r>
+              <a:rPr lang="es-ES" dirty="0"/>
+              <a:t>.</a:t>
+            </a:r>
+          </a:p>
+          <a:p>
+            <a:endParaRPr lang="es-ES" dirty="0"/>
+          </a:p>
+          <a:p>
+            <a:r>
+              <a:rPr lang="es-ES" dirty="0"/>
+              <a:t>El objetivo consiste en buscar todos los dispositivos con un </a:t>
+            </a:r>
+            <a:r>
+              <a:rPr lang="es-ES" dirty="0" err="1"/>
+              <a:t>login</a:t>
+            </a:r>
+            <a:r>
+              <a:rPr lang="es-ES" dirty="0"/>
+              <a:t> web de administración, por lo general de </a:t>
+            </a:r>
+            <a:r>
+              <a:rPr lang="es-ES" dirty="0" err="1"/>
+              <a:t>routers</a:t>
+            </a:r>
+            <a:r>
+              <a:rPr lang="es-ES" dirty="0"/>
+              <a:t>.</a:t>
+            </a:r>
+          </a:p>
+          <a:p>
+            <a:endParaRPr lang="es-ES" dirty="0"/>
+          </a:p>
+          <a:p>
+            <a:r>
+              <a:rPr lang="es-ES" dirty="0"/>
+              <a:t>De esta manera podríamos comprobar si para alguno de ellos se sigue usando las credenciales por defecto. Trabajo tedioso.</a:t>
+            </a:r>
+          </a:p>
+          <a:p>
+            <a:r>
+              <a:rPr lang="es-ES" dirty="0"/>
+              <a:t>[</a:t>
+            </a:r>
+            <a:r>
+              <a:rPr lang="es-ES" dirty="0" err="1"/>
+              <a:t>disclaimer</a:t>
+            </a:r>
+            <a:r>
+              <a:rPr lang="es-ES" dirty="0"/>
+              <a:t>]</a:t>
+            </a:r>
+          </a:p>
+          <a:p>
+            <a:endParaRPr lang="es-ES" dirty="0"/>
+          </a:p>
+          <a:p>
+            <a:r>
+              <a:rPr lang="es-ES" dirty="0"/>
+              <a:t>Para eso: Automatizar la comprobación de credenciales. Emulando ser un navegador, (mediante web </a:t>
+            </a:r>
+            <a:r>
+              <a:rPr lang="es-ES" dirty="0" err="1"/>
+              <a:t>scrapping</a:t>
+            </a:r>
+            <a:r>
+              <a:rPr lang="es-ES" dirty="0"/>
+              <a:t> me fue técnicamente imposible)</a:t>
+            </a:r>
+          </a:p>
+          <a:p>
+            <a:endParaRPr lang="es-ES" dirty="0"/>
+          </a:p>
+          <a:p>
+            <a:r>
+              <a:rPr lang="es-ES" dirty="0"/>
+              <a:t>Por ultimo, visualizar la información </a:t>
+            </a:r>
+            <a:r>
+              <a:rPr lang="es-ES" dirty="0" err="1"/>
+              <a:t>rcopilada</a:t>
+            </a:r>
+            <a:r>
+              <a:rPr lang="es-ES" dirty="0"/>
+              <a:t> y procesada por mi aplicación.</a:t>
+            </a:r>
+          </a:p>
+          <a:p>
+            <a:endParaRPr lang="es-ES" dirty="0"/>
+          </a:p>
+          <a:p>
+            <a:r>
+              <a:rPr lang="es-ES" dirty="0"/>
+              <a:t>Para todo esto: he decidido basarme en la interfaz grafica LUCI de </a:t>
+            </a:r>
+            <a:r>
+              <a:rPr lang="es-ES" dirty="0" err="1"/>
+              <a:t>openwrt</a:t>
+            </a:r>
+            <a:r>
+              <a:rPr lang="es-ES" dirty="0"/>
+              <a:t>, que usamos a lo largo del curso en nuestra ci40</a:t>
+            </a:r>
+          </a:p>
+          <a:p>
+            <a:r>
+              <a:rPr lang="es-ES" dirty="0"/>
+              <a:t>Utilizando mi dispositivo para no infringir ninguna ley.</a:t>
+            </a:r>
+          </a:p>
+          <a:p>
+            <a:endParaRPr lang="es-ES" dirty="0"/>
+          </a:p>
+          <a:p>
+            <a:r>
+              <a:rPr lang="es-ES" dirty="0"/>
+              <a:t>Vamos con la demo!</a:t>
+            </a:r>
+          </a:p>
+          <a:p>
+            <a:endParaRPr lang="es-ES" dirty="0"/>
+          </a:p>
+          <a:p>
+            <a:endParaRPr lang="es-ES" dirty="0"/>
+          </a:p>
+          <a:p>
+            <a:endParaRPr lang="es-ES" dirty="0"/>
           </a:p>
         </p:txBody>
       </p:sp>
@@ -1806,7 +1949,251 @@
           <a:p>
             <a:fld id="{0241355A-48D2-4B27-B3E0-8F6DA1472C65}" type="slidenum">
               <a:rPr lang="es-ES" smtClean="0"/>
-              <a:t>8</a:t>
+              <a:t>7</a:t>
+            </a:fld>
+            <a:endParaRPr lang="es-ES"/>
+          </a:p>
+        </p:txBody>
+      </p:sp>
+    </p:spTree>
+    <p:extLst>
+      <p:ext uri="{BB962C8B-B14F-4D97-AF65-F5344CB8AC3E}">
+        <p14:creationId xmlns:p14="http://schemas.microsoft.com/office/powerpoint/2010/main" val="1479877958"/>
+      </p:ext>
+    </p:extLst>
+  </p:cSld>
+  <p:clrMapOvr>
+    <a:masterClrMapping/>
+  </p:clrMapOvr>
+</p:notes>
+</file>
+
+<file path=ppt/notesSlides/notesSlide8.xml><?xml version="1.0" encoding="utf-8"?>
+<p:notes xmlns:a="http://schemas.openxmlformats.org/drawingml/2006/main" xmlns:r="http://schemas.openxmlformats.org/officeDocument/2006/relationships" xmlns:p="http://schemas.openxmlformats.org/presentationml/2006/main">
+  <p:cSld>
+    <p:spTree>
+      <p:nvGrpSpPr>
+        <p:cNvPr id="1" name=""/>
+        <p:cNvGrpSpPr/>
+        <p:nvPr/>
+      </p:nvGrpSpPr>
+      <p:grpSpPr>
+        <a:xfrm>
+          <a:off x="0" y="0"/>
+          <a:ext cx="0" cy="0"/>
+          <a:chOff x="0" y="0"/>
+          <a:chExt cx="0" cy="0"/>
+        </a:xfrm>
+      </p:grpSpPr>
+      <p:sp>
+        <p:nvSpPr>
+          <p:cNvPr id="2" name="Marcador de imagen de diapositiva 1"/>
+          <p:cNvSpPr>
+            <a:spLocks noGrp="1" noRot="1" noChangeAspect="1"/>
+          </p:cNvSpPr>
+          <p:nvPr>
+            <p:ph type="sldImg"/>
+          </p:nvPr>
+        </p:nvSpPr>
+        <p:spPr/>
+      </p:sp>
+      <p:sp>
+        <p:nvSpPr>
+          <p:cNvPr id="3" name="Marcador de notas 2"/>
+          <p:cNvSpPr>
+            <a:spLocks noGrp="1"/>
+          </p:cNvSpPr>
+          <p:nvPr>
+            <p:ph type="body" idx="1"/>
+          </p:nvPr>
+        </p:nvSpPr>
+        <p:spPr/>
+        <p:txBody>
+          <a:bodyPr/>
+          <a:lstStyle/>
+          <a:p>
+            <a:endParaRPr lang="es-ES" dirty="0"/>
+          </a:p>
+        </p:txBody>
+      </p:sp>
+      <p:sp>
+        <p:nvSpPr>
+          <p:cNvPr id="4" name="Marcador de encabezado 3"/>
+          <p:cNvSpPr>
+            <a:spLocks noGrp="1"/>
+          </p:cNvSpPr>
+          <p:nvPr>
+            <p:ph type="hdr" sz="quarter"/>
+          </p:nvPr>
+        </p:nvSpPr>
+        <p:spPr/>
+        <p:txBody>
+          <a:bodyPr/>
+          <a:lstStyle/>
+          <a:p>
+            <a:endParaRPr lang="es-ES"/>
+          </a:p>
+        </p:txBody>
+      </p:sp>
+      <p:sp>
+        <p:nvSpPr>
+          <p:cNvPr id="5" name="Marcador de pie de página 4"/>
+          <p:cNvSpPr>
+            <a:spLocks noGrp="1"/>
+          </p:cNvSpPr>
+          <p:nvPr>
+            <p:ph type="ftr" sz="quarter" idx="4"/>
+          </p:nvPr>
+        </p:nvSpPr>
+        <p:spPr/>
+        <p:txBody>
+          <a:bodyPr/>
+          <a:lstStyle/>
+          <a:p>
+            <a:endParaRPr lang="es-ES"/>
+          </a:p>
+        </p:txBody>
+      </p:sp>
+      <p:sp>
+        <p:nvSpPr>
+          <p:cNvPr id="6" name="Marcador de número de diapositiva 5"/>
+          <p:cNvSpPr>
+            <a:spLocks noGrp="1"/>
+          </p:cNvSpPr>
+          <p:nvPr>
+            <p:ph type="sldNum" sz="quarter" idx="5"/>
+          </p:nvPr>
+        </p:nvSpPr>
+        <p:spPr/>
+        <p:txBody>
+          <a:bodyPr/>
+          <a:lstStyle/>
+          <a:p>
+            <a:fld id="{0241355A-48D2-4B27-B3E0-8F6DA1472C65}" type="slidenum">
+              <a:rPr lang="es-ES" smtClean="0"/>
+              <a:t>9</a:t>
+            </a:fld>
+            <a:endParaRPr lang="es-ES"/>
+          </a:p>
+        </p:txBody>
+      </p:sp>
+    </p:spTree>
+    <p:extLst>
+      <p:ext uri="{BB962C8B-B14F-4D97-AF65-F5344CB8AC3E}">
+        <p14:creationId xmlns:p14="http://schemas.microsoft.com/office/powerpoint/2010/main" val="2573044874"/>
+      </p:ext>
+    </p:extLst>
+  </p:cSld>
+  <p:clrMapOvr>
+    <a:masterClrMapping/>
+  </p:clrMapOvr>
+</p:notes>
+</file>
+
+<file path=ppt/notesSlides/notesSlide9.xml><?xml version="1.0" encoding="utf-8"?>
+<p:notes xmlns:a="http://schemas.openxmlformats.org/drawingml/2006/main" xmlns:r="http://schemas.openxmlformats.org/officeDocument/2006/relationships" xmlns:p="http://schemas.openxmlformats.org/presentationml/2006/main">
+  <p:cSld>
+    <p:spTree>
+      <p:nvGrpSpPr>
+        <p:cNvPr id="1" name=""/>
+        <p:cNvGrpSpPr/>
+        <p:nvPr/>
+      </p:nvGrpSpPr>
+      <p:grpSpPr>
+        <a:xfrm>
+          <a:off x="0" y="0"/>
+          <a:ext cx="0" cy="0"/>
+          <a:chOff x="0" y="0"/>
+          <a:chExt cx="0" cy="0"/>
+        </a:xfrm>
+      </p:grpSpPr>
+      <p:sp>
+        <p:nvSpPr>
+          <p:cNvPr id="2" name="Marcador de imagen de diapositiva 1"/>
+          <p:cNvSpPr>
+            <a:spLocks noGrp="1" noRot="1" noChangeAspect="1"/>
+          </p:cNvSpPr>
+          <p:nvPr>
+            <p:ph type="sldImg"/>
+          </p:nvPr>
+        </p:nvSpPr>
+        <p:spPr/>
+      </p:sp>
+      <p:sp>
+        <p:nvSpPr>
+          <p:cNvPr id="3" name="Marcador de notas 2"/>
+          <p:cNvSpPr>
+            <a:spLocks noGrp="1"/>
+          </p:cNvSpPr>
+          <p:nvPr>
+            <p:ph type="body" idx="1"/>
+          </p:nvPr>
+        </p:nvSpPr>
+        <p:spPr/>
+        <p:txBody>
+          <a:bodyPr/>
+          <a:lstStyle/>
+          <a:p>
+            <a:endParaRPr lang="es-ES"/>
+          </a:p>
+        </p:txBody>
+      </p:sp>
+      <p:sp>
+        <p:nvSpPr>
+          <p:cNvPr id="4" name="Marcador de encabezado 3"/>
+          <p:cNvSpPr>
+            <a:spLocks noGrp="1"/>
+          </p:cNvSpPr>
+          <p:nvPr>
+            <p:ph type="hdr" sz="quarter"/>
+          </p:nvPr>
+        </p:nvSpPr>
+        <p:spPr/>
+        <p:txBody>
+          <a:bodyPr/>
+          <a:lstStyle/>
+          <a:p>
+            <a:endParaRPr lang="es-ES"/>
+          </a:p>
+        </p:txBody>
+      </p:sp>
+      <p:sp>
+        <p:nvSpPr>
+          <p:cNvPr id="5" name="Marcador de pie de página 4"/>
+          <p:cNvSpPr>
+            <a:spLocks noGrp="1"/>
+          </p:cNvSpPr>
+          <p:nvPr>
+            <p:ph type="ftr" sz="quarter" idx="4"/>
+          </p:nvPr>
+        </p:nvSpPr>
+        <p:spPr/>
+        <p:txBody>
+          <a:bodyPr/>
+          <a:lstStyle/>
+          <a:p>
+            <a:endParaRPr lang="es-ES"/>
+          </a:p>
+        </p:txBody>
+      </p:sp>
+      <p:sp>
+        <p:nvSpPr>
+          <p:cNvPr id="6" name="Marcador de número de diapositiva 5"/>
+          <p:cNvSpPr>
+            <a:spLocks noGrp="1"/>
+          </p:cNvSpPr>
+          <p:nvPr>
+            <p:ph type="sldNum" sz="quarter" idx="5"/>
+          </p:nvPr>
+        </p:nvSpPr>
+        <p:spPr/>
+        <p:txBody>
+          <a:bodyPr/>
+          <a:lstStyle/>
+          <a:p>
+            <a:fld id="{0241355A-48D2-4B27-B3E0-8F6DA1472C65}" type="slidenum">
+              <a:rPr lang="es-ES" smtClean="0"/>
+              <a:t>10</a:t>
             </a:fld>
             <a:endParaRPr lang="es-ES"/>
           </a:p>
@@ -7706,6 +8093,174 @@
 </p:sld>
 </file>
 
+<file path=ppt/slides/slide10.xml><?xml version="1.0" encoding="utf-8"?>
+<p:sld xmlns:a="http://schemas.openxmlformats.org/drawingml/2006/main" xmlns:r="http://schemas.openxmlformats.org/officeDocument/2006/relationships" xmlns:p="http://schemas.openxmlformats.org/presentationml/2006/main">
+  <p:cSld>
+    <p:spTree>
+      <p:nvGrpSpPr>
+        <p:cNvPr id="1" name=""/>
+        <p:cNvGrpSpPr/>
+        <p:nvPr/>
+      </p:nvGrpSpPr>
+      <p:grpSpPr>
+        <a:xfrm>
+          <a:off x="0" y="0"/>
+          <a:ext cx="0" cy="0"/>
+          <a:chOff x="0" y="0"/>
+          <a:chExt cx="0" cy="0"/>
+        </a:xfrm>
+      </p:grpSpPr>
+      <p:sp>
+        <p:nvSpPr>
+          <p:cNvPr id="2" name="Título 1">
+            <a:extLst>
+              <a:ext uri="{FF2B5EF4-FFF2-40B4-BE49-F238E27FC236}">
+                <a16:creationId xmlns:a16="http://schemas.microsoft.com/office/drawing/2014/main" id="{C59C47E9-4F53-4D1A-AF58-04E6C5657EE1}"/>
+              </a:ext>
+            </a:extLst>
+          </p:cNvPr>
+          <p:cNvSpPr>
+            <a:spLocks noGrp="1"/>
+          </p:cNvSpPr>
+          <p:nvPr>
+            <p:ph type="title"/>
+          </p:nvPr>
+        </p:nvSpPr>
+        <p:spPr>
+          <a:xfrm>
+            <a:off x="1579033" y="787400"/>
+            <a:ext cx="9033933" cy="4199466"/>
+          </a:xfrm>
+        </p:spPr>
+        <p:txBody>
+          <a:bodyPr>
+            <a:noAutofit/>
+          </a:bodyPr>
+          <a:lstStyle/>
+          <a:p>
+            <a:pPr algn="ctr"/>
+            <a:br>
+              <a:rPr lang="es-ES" sz="9600" dirty="0"/>
+            </a:br>
+            <a:r>
+              <a:rPr lang="es-ES" sz="8800" dirty="0">
+                <a:solidFill>
+                  <a:schemeClr val="accent1">
+                    <a:lumMod val="50000"/>
+                  </a:schemeClr>
+                </a:solidFill>
+              </a:rPr>
+              <a:t>Muchas gracias</a:t>
+            </a:r>
+            <a:br>
+              <a:rPr lang="es-ES" sz="9600" dirty="0"/>
+            </a:br>
+            <a:endParaRPr lang="es-ES" sz="9600" i="1" dirty="0"/>
+          </a:p>
+        </p:txBody>
+      </p:sp>
+    </p:spTree>
+    <p:extLst>
+      <p:ext uri="{BB962C8B-B14F-4D97-AF65-F5344CB8AC3E}">
+        <p14:creationId xmlns:p14="http://schemas.microsoft.com/office/powerpoint/2010/main" val="2834538423"/>
+      </p:ext>
+    </p:extLst>
+  </p:cSld>
+  <p:clrMapOvr>
+    <a:masterClrMapping/>
+  </p:clrMapOvr>
+  <p:timing>
+    <p:tnLst>
+      <p:par>
+        <p:cTn id="1" dur="indefinite" restart="never" nodeType="tmRoot">
+          <p:childTnLst>
+            <p:seq concurrent="1" nextAc="seek">
+              <p:cTn id="2" dur="indefinite" nodeType="mainSeq">
+                <p:childTnLst>
+                  <p:par>
+                    <p:cTn id="3" fill="hold">
+                      <p:stCondLst>
+                        <p:cond delay="indefinite"/>
+                        <p:cond evt="onBegin" delay="0">
+                          <p:tn val="2"/>
+                        </p:cond>
+                      </p:stCondLst>
+                      <p:childTnLst>
+                        <p:par>
+                          <p:cTn id="4" fill="hold">
+                            <p:stCondLst>
+                              <p:cond delay="0"/>
+                            </p:stCondLst>
+                            <p:childTnLst>
+                              <p:par>
+                                <p:cTn id="5" presetID="10" presetClass="entr" presetSubtype="0" fill="hold" grpId="0" nodeType="withEffect">
+                                  <p:stCondLst>
+                                    <p:cond delay="0"/>
+                                  </p:stCondLst>
+                                  <p:childTnLst>
+                                    <p:set>
+                                      <p:cBhvr>
+                                        <p:cTn id="6" dur="1" fill="hold">
+                                          <p:stCondLst>
+                                            <p:cond delay="0"/>
+                                          </p:stCondLst>
+                                        </p:cTn>
+                                        <p:tgtEl>
+                                          <p:spTgt spid="2"/>
+                                        </p:tgtEl>
+                                        <p:attrNameLst>
+                                          <p:attrName>style.visibility</p:attrName>
+                                        </p:attrNameLst>
+                                      </p:cBhvr>
+                                      <p:to>
+                                        <p:strVal val="visible"/>
+                                      </p:to>
+                                    </p:set>
+                                    <p:animEffect transition="in" filter="fade">
+                                      <p:cBhvr>
+                                        <p:cTn id="7" dur="500"/>
+                                        <p:tgtEl>
+                                          <p:spTgt spid="2"/>
+                                        </p:tgtEl>
+                                      </p:cBhvr>
+                                    </p:animEffect>
+                                  </p:childTnLst>
+                                </p:cTn>
+                              </p:par>
+                            </p:childTnLst>
+                          </p:cTn>
+                        </p:par>
+                      </p:childTnLst>
+                    </p:cTn>
+                  </p:par>
+                </p:childTnLst>
+              </p:cTn>
+              <p:prevCondLst>
+                <p:cond evt="onPrev" delay="0">
+                  <p:tgtEl>
+                    <p:sldTgt/>
+                  </p:tgtEl>
+                </p:cond>
+              </p:prevCondLst>
+              <p:nextCondLst>
+                <p:cond evt="onNext" delay="0">
+                  <p:tgtEl>
+                    <p:sldTgt/>
+                  </p:tgtEl>
+                </p:cond>
+              </p:nextCondLst>
+            </p:seq>
+          </p:childTnLst>
+        </p:cTn>
+      </p:par>
+    </p:tnLst>
+    <p:bldLst>
+      <p:bldP spid="2" grpId="0"/>
+    </p:bldLst>
+  </p:timing>
+</p:sld>
+</file>
+
 <file path=ppt/slides/slide2.xml><?xml version="1.0" encoding="utf-8"?>
 <p:sld xmlns:a="http://schemas.openxmlformats.org/drawingml/2006/main" xmlns:r="http://schemas.openxmlformats.org/officeDocument/2006/relationships" xmlns:p="http://schemas.openxmlformats.org/presentationml/2006/main">
   <p:cSld>
@@ -7761,6 +8316,798 @@
           <a:p>
             <a:r>
               <a:rPr lang="en-US" dirty="0" err="1"/>
+              <a:t>Contenido</a:t>
+            </a:r>
+            <a:endParaRPr lang="en-US" dirty="0"/>
+          </a:p>
+        </p:txBody>
+      </p:sp>
+      <p:sp>
+        <p:nvSpPr>
+          <p:cNvPr id="10" name="Marcador de contenido 9">
+            <a:extLst>
+              <a:ext uri="{FF2B5EF4-FFF2-40B4-BE49-F238E27FC236}">
+                <a16:creationId xmlns:a16="http://schemas.microsoft.com/office/drawing/2014/main" id="{6638CDBA-F88D-40F3-AA8B-850CEDDB4809}"/>
+              </a:ext>
+            </a:extLst>
+          </p:cNvPr>
+          <p:cNvSpPr>
+            <a:spLocks noGrp="1"/>
+          </p:cNvSpPr>
+          <p:nvPr>
+            <p:ph idx="1"/>
+          </p:nvPr>
+        </p:nvSpPr>
+        <p:spPr>
+          <a:xfrm>
+            <a:off x="554072" y="1828030"/>
+            <a:ext cx="4524646" cy="5340107"/>
+          </a:xfrm>
+        </p:spPr>
+        <p:txBody>
+          <a:bodyPr>
+            <a:noAutofit/>
+          </a:bodyPr>
+          <a:lstStyle/>
+          <a:p>
+            <a:pPr marL="514350" indent="-514350">
+              <a:spcBef>
+                <a:spcPts val="1000"/>
+              </a:spcBef>
+              <a:buClr>
+                <a:schemeClr val="accent1"/>
+              </a:buClr>
+              <a:buSzPct val="80000"/>
+              <a:buFont typeface="+mj-lt"/>
+              <a:buAutoNum type="arabicPeriod"/>
+            </a:pPr>
+            <a:r>
+              <a:rPr lang="es-ES" sz="2800" b="1" dirty="0"/>
+              <a:t>Qué es</a:t>
+            </a:r>
+          </a:p>
+          <a:p>
+            <a:pPr marL="514350" indent="-514350">
+              <a:spcBef>
+                <a:spcPts val="1000"/>
+              </a:spcBef>
+              <a:buClr>
+                <a:schemeClr val="accent1"/>
+              </a:buClr>
+              <a:buSzPct val="80000"/>
+              <a:buFont typeface="+mj-lt"/>
+              <a:buAutoNum type="arabicPeriod"/>
+            </a:pPr>
+            <a:endParaRPr lang="es-ES" sz="2800" b="1" dirty="0"/>
+          </a:p>
+          <a:p>
+            <a:pPr marL="514350" indent="-514350">
+              <a:spcBef>
+                <a:spcPts val="1000"/>
+              </a:spcBef>
+              <a:buClr>
+                <a:schemeClr val="accent1"/>
+              </a:buClr>
+              <a:buSzPct val="80000"/>
+              <a:buFont typeface="+mj-lt"/>
+              <a:buAutoNum type="arabicPeriod"/>
+            </a:pPr>
+            <a:r>
+              <a:rPr lang="es-ES" sz="2800" b="1" dirty="0"/>
+              <a:t>Cómo funciona</a:t>
+            </a:r>
+          </a:p>
+          <a:p>
+            <a:pPr marL="514350" indent="-514350">
+              <a:spcBef>
+                <a:spcPts val="1000"/>
+              </a:spcBef>
+              <a:buClr>
+                <a:schemeClr val="accent1"/>
+              </a:buClr>
+              <a:buSzPct val="80000"/>
+              <a:buFont typeface="+mj-lt"/>
+              <a:buAutoNum type="arabicPeriod"/>
+            </a:pPr>
+            <a:endParaRPr lang="es-ES" sz="2800" b="1" dirty="0"/>
+          </a:p>
+          <a:p>
+            <a:pPr marL="514350" indent="-514350">
+              <a:spcBef>
+                <a:spcPts val="1000"/>
+              </a:spcBef>
+              <a:buClr>
+                <a:schemeClr val="accent1"/>
+              </a:buClr>
+              <a:buSzPct val="80000"/>
+              <a:buFont typeface="+mj-lt"/>
+              <a:buAutoNum type="arabicPeriod"/>
+            </a:pPr>
+            <a:r>
+              <a:rPr lang="es-ES" sz="2800" b="1" dirty="0"/>
+              <a:t>Qué ofrece</a:t>
+            </a:r>
+          </a:p>
+          <a:p>
+            <a:pPr>
+              <a:spcBef>
+                <a:spcPts val="1000"/>
+              </a:spcBef>
+              <a:buClr>
+                <a:schemeClr val="accent1"/>
+              </a:buClr>
+              <a:buSzPct val="80000"/>
+              <a:buFont typeface="Wingdings 3" charset="2"/>
+              <a:buChar char=""/>
+            </a:pPr>
+            <a:endParaRPr lang="es-ES" sz="2800" b="1" dirty="0"/>
+          </a:p>
+          <a:p>
+            <a:pPr>
+              <a:spcBef>
+                <a:spcPts val="1000"/>
+              </a:spcBef>
+              <a:buClr>
+                <a:schemeClr val="accent1"/>
+              </a:buClr>
+              <a:buSzPct val="80000"/>
+              <a:buFont typeface="Wingdings 3" charset="2"/>
+              <a:buChar char=""/>
+            </a:pPr>
+            <a:endParaRPr lang="en-US" sz="2800" dirty="0"/>
+          </a:p>
+        </p:txBody>
+      </p:sp>
+      <p:sp>
+        <p:nvSpPr>
+          <p:cNvPr id="3" name="CuadroTexto 2">
+            <a:extLst>
+              <a:ext uri="{FF2B5EF4-FFF2-40B4-BE49-F238E27FC236}">
+                <a16:creationId xmlns:a16="http://schemas.microsoft.com/office/drawing/2014/main" id="{72F9ACAF-4164-4BE7-8E70-DF1EB0CEBE93}"/>
+              </a:ext>
+            </a:extLst>
+          </p:cNvPr>
+          <p:cNvSpPr txBox="1"/>
+          <p:nvPr/>
+        </p:nvSpPr>
+        <p:spPr>
+          <a:xfrm>
+            <a:off x="5078718" y="1490007"/>
+            <a:ext cx="4619354" cy="4006225"/>
+          </a:xfrm>
+          <a:prstGeom prst="rect">
+            <a:avLst/>
+          </a:prstGeom>
+          <a:noFill/>
+        </p:spPr>
+        <p:txBody>
+          <a:bodyPr wrap="square" rtlCol="0">
+            <a:spAutoFit/>
+          </a:bodyPr>
+          <a:lstStyle/>
+          <a:p>
+            <a:pPr marL="514350" indent="-514350">
+              <a:spcBef>
+                <a:spcPts val="1000"/>
+              </a:spcBef>
+              <a:buClr>
+                <a:schemeClr val="accent1"/>
+              </a:buClr>
+              <a:buSzPct val="80000"/>
+              <a:buFont typeface="+mj-lt"/>
+              <a:buAutoNum type="arabicPeriod" startAt="4"/>
+            </a:pPr>
+            <a:r>
+              <a:rPr lang="en-US" sz="2800" b="1" dirty="0" err="1"/>
+              <a:t>Demostración</a:t>
+            </a:r>
+            <a:r>
+              <a:rPr lang="en-US" sz="2800" b="1" dirty="0"/>
+              <a:t> </a:t>
+            </a:r>
+            <a:r>
+              <a:rPr lang="en-US" sz="2800" b="1" dirty="0" err="1"/>
+              <a:t>práctica</a:t>
+            </a:r>
+            <a:r>
+              <a:rPr lang="en-US" sz="2800" dirty="0"/>
+              <a:t>: </a:t>
+            </a:r>
+          </a:p>
+          <a:p>
+            <a:pPr lvl="1">
+              <a:spcBef>
+                <a:spcPts val="1000"/>
+              </a:spcBef>
+              <a:buClr>
+                <a:schemeClr val="accent1"/>
+              </a:buClr>
+              <a:buSzPct val="80000"/>
+            </a:pPr>
+            <a:r>
+              <a:rPr lang="en-US" sz="2800" dirty="0" err="1"/>
+              <a:t>Uso</a:t>
+            </a:r>
+            <a:r>
+              <a:rPr lang="en-US" sz="2800" dirty="0"/>
+              <a:t> web y de la API</a:t>
+            </a:r>
+          </a:p>
+          <a:p>
+            <a:pPr marL="514350" indent="-514350">
+              <a:spcBef>
+                <a:spcPts val="1000"/>
+              </a:spcBef>
+              <a:buClr>
+                <a:schemeClr val="accent1"/>
+              </a:buClr>
+              <a:buSzPct val="80000"/>
+              <a:buFont typeface="+mj-lt"/>
+              <a:buAutoNum type="arabicPeriod" startAt="4"/>
+            </a:pPr>
+            <a:endParaRPr lang="en-US" sz="2800" dirty="0"/>
+          </a:p>
+          <a:p>
+            <a:pPr marL="514350" indent="-514350">
+              <a:spcBef>
+                <a:spcPts val="1000"/>
+              </a:spcBef>
+              <a:buClr>
+                <a:schemeClr val="accent1"/>
+              </a:buClr>
+              <a:buSzPct val="80000"/>
+              <a:buFont typeface="+mj-lt"/>
+              <a:buAutoNum type="arabicPeriod" startAt="4"/>
+            </a:pPr>
+            <a:r>
+              <a:rPr lang="en-US" sz="2800" b="1" dirty="0" err="1"/>
+              <a:t>Conclusiones</a:t>
+            </a:r>
+            <a:endParaRPr lang="en-US" sz="2800" b="1" dirty="0"/>
+          </a:p>
+          <a:p>
+            <a:pPr marL="514350" indent="-514350">
+              <a:spcBef>
+                <a:spcPts val="1000"/>
+              </a:spcBef>
+              <a:buClr>
+                <a:schemeClr val="accent1"/>
+              </a:buClr>
+              <a:buSzPct val="80000"/>
+              <a:buFont typeface="+mj-lt"/>
+              <a:buAutoNum type="arabicPeriod" startAt="4"/>
+            </a:pPr>
+            <a:endParaRPr lang="en-US" sz="2800" b="1" dirty="0"/>
+          </a:p>
+          <a:p>
+            <a:pPr>
+              <a:spcBef>
+                <a:spcPts val="1000"/>
+              </a:spcBef>
+              <a:buClr>
+                <a:schemeClr val="accent1"/>
+              </a:buClr>
+              <a:buSzPct val="80000"/>
+            </a:pPr>
+            <a:r>
+              <a:rPr lang="en-US" sz="2800" b="1"/>
+              <a:t>Referencias</a:t>
+            </a:r>
+            <a:endParaRPr lang="en-US" sz="2800" b="1" dirty="0"/>
+          </a:p>
+          <a:p>
+            <a:pPr>
+              <a:spcBef>
+                <a:spcPts val="1000"/>
+              </a:spcBef>
+              <a:buClr>
+                <a:schemeClr val="accent1"/>
+              </a:buClr>
+              <a:buSzPct val="80000"/>
+              <a:buFont typeface="Wingdings 3" charset="2"/>
+              <a:buChar char=""/>
+            </a:pPr>
+            <a:endParaRPr lang="en-US" sz="1400" b="1" dirty="0"/>
+          </a:p>
+          <a:p>
+            <a:pPr>
+              <a:spcBef>
+                <a:spcPts val="1000"/>
+              </a:spcBef>
+              <a:buClr>
+                <a:schemeClr val="accent1"/>
+              </a:buClr>
+              <a:buSzPct val="80000"/>
+              <a:buFont typeface="Wingdings 3" charset="2"/>
+              <a:buChar char=""/>
+            </a:pPr>
+            <a:endParaRPr lang="en-US" sz="1400" dirty="0"/>
+          </a:p>
+        </p:txBody>
+      </p:sp>
+    </p:spTree>
+    <p:extLst>
+      <p:ext uri="{BB962C8B-B14F-4D97-AF65-F5344CB8AC3E}">
+        <p14:creationId xmlns:p14="http://schemas.microsoft.com/office/powerpoint/2010/main" val="334522380"/>
+      </p:ext>
+    </p:extLst>
+  </p:cSld>
+  <p:clrMapOvr>
+    <a:masterClrMapping/>
+  </p:clrMapOvr>
+  <p:timing>
+    <p:tnLst>
+      <p:par>
+        <p:cTn id="1" dur="indefinite" restart="never" nodeType="tmRoot">
+          <p:childTnLst>
+            <p:seq concurrent="1" nextAc="seek">
+              <p:cTn id="2" dur="indefinite" nodeType="mainSeq">
+                <p:childTnLst>
+                  <p:par>
+                    <p:cTn id="3" fill="hold">
+                      <p:stCondLst>
+                        <p:cond delay="indefinite"/>
+                      </p:stCondLst>
+                      <p:childTnLst>
+                        <p:par>
+                          <p:cTn id="4" fill="hold">
+                            <p:stCondLst>
+                              <p:cond delay="0"/>
+                            </p:stCondLst>
+                            <p:childTnLst>
+                              <p:par>
+                                <p:cTn id="5" presetID="10" presetClass="entr" presetSubtype="0" fill="hold" grpId="0" nodeType="clickEffect">
+                                  <p:stCondLst>
+                                    <p:cond delay="0"/>
+                                  </p:stCondLst>
+                                  <p:childTnLst>
+                                    <p:set>
+                                      <p:cBhvr>
+                                        <p:cTn id="6" dur="1" fill="hold">
+                                          <p:stCondLst>
+                                            <p:cond delay="0"/>
+                                          </p:stCondLst>
+                                        </p:cTn>
+                                        <p:tgtEl>
+                                          <p:spTgt spid="10">
+                                            <p:txEl>
+                                              <p:pRg st="0" end="0"/>
+                                            </p:txEl>
+                                          </p:spTgt>
+                                        </p:tgtEl>
+                                        <p:attrNameLst>
+                                          <p:attrName>style.visibility</p:attrName>
+                                        </p:attrNameLst>
+                                      </p:cBhvr>
+                                      <p:to>
+                                        <p:strVal val="visible"/>
+                                      </p:to>
+                                    </p:set>
+                                    <p:animEffect transition="in" filter="fade">
+                                      <p:cBhvr>
+                                        <p:cTn id="7" dur="500"/>
+                                        <p:tgtEl>
+                                          <p:spTgt spid="10">
+                                            <p:txEl>
+                                              <p:pRg st="0" end="0"/>
+                                            </p:txEl>
+                                          </p:spTgt>
+                                        </p:tgtEl>
+                                      </p:cBhvr>
+                                    </p:animEffect>
+                                  </p:childTnLst>
+                                </p:cTn>
+                              </p:par>
+                            </p:childTnLst>
+                          </p:cTn>
+                        </p:par>
+                        <p:par>
+                          <p:cTn id="8" fill="hold">
+                            <p:stCondLst>
+                              <p:cond delay="500"/>
+                            </p:stCondLst>
+                            <p:childTnLst>
+                              <p:par>
+                                <p:cTn id="9" presetID="10" presetClass="entr" presetSubtype="0" fill="hold" grpId="0" nodeType="afterEffect">
+                                  <p:stCondLst>
+                                    <p:cond delay="0"/>
+                                  </p:stCondLst>
+                                  <p:childTnLst>
+                                    <p:set>
+                                      <p:cBhvr>
+                                        <p:cTn id="10" dur="1" fill="hold">
+                                          <p:stCondLst>
+                                            <p:cond delay="0"/>
+                                          </p:stCondLst>
+                                        </p:cTn>
+                                        <p:tgtEl>
+                                          <p:spTgt spid="10">
+                                            <p:txEl>
+                                              <p:pRg st="2" end="2"/>
+                                            </p:txEl>
+                                          </p:spTgt>
+                                        </p:tgtEl>
+                                        <p:attrNameLst>
+                                          <p:attrName>style.visibility</p:attrName>
+                                        </p:attrNameLst>
+                                      </p:cBhvr>
+                                      <p:to>
+                                        <p:strVal val="visible"/>
+                                      </p:to>
+                                    </p:set>
+                                    <p:animEffect transition="in" filter="fade">
+                                      <p:cBhvr>
+                                        <p:cTn id="11" dur="500"/>
+                                        <p:tgtEl>
+                                          <p:spTgt spid="10">
+                                            <p:txEl>
+                                              <p:pRg st="2" end="2"/>
+                                            </p:txEl>
+                                          </p:spTgt>
+                                        </p:tgtEl>
+                                      </p:cBhvr>
+                                    </p:animEffect>
+                                  </p:childTnLst>
+                                </p:cTn>
+                              </p:par>
+                            </p:childTnLst>
+                          </p:cTn>
+                        </p:par>
+                        <p:par>
+                          <p:cTn id="12" fill="hold">
+                            <p:stCondLst>
+                              <p:cond delay="1000"/>
+                            </p:stCondLst>
+                            <p:childTnLst>
+                              <p:par>
+                                <p:cTn id="13" presetID="10" presetClass="entr" presetSubtype="0" fill="hold" grpId="0" nodeType="afterEffect">
+                                  <p:stCondLst>
+                                    <p:cond delay="0"/>
+                                  </p:stCondLst>
+                                  <p:childTnLst>
+                                    <p:set>
+                                      <p:cBhvr>
+                                        <p:cTn id="14" dur="1" fill="hold">
+                                          <p:stCondLst>
+                                            <p:cond delay="0"/>
+                                          </p:stCondLst>
+                                        </p:cTn>
+                                        <p:tgtEl>
+                                          <p:spTgt spid="10">
+                                            <p:txEl>
+                                              <p:pRg st="4" end="4"/>
+                                            </p:txEl>
+                                          </p:spTgt>
+                                        </p:tgtEl>
+                                        <p:attrNameLst>
+                                          <p:attrName>style.visibility</p:attrName>
+                                        </p:attrNameLst>
+                                      </p:cBhvr>
+                                      <p:to>
+                                        <p:strVal val="visible"/>
+                                      </p:to>
+                                    </p:set>
+                                    <p:animEffect transition="in" filter="fade">
+                                      <p:cBhvr>
+                                        <p:cTn id="15" dur="500"/>
+                                        <p:tgtEl>
+                                          <p:spTgt spid="10">
+                                            <p:txEl>
+                                              <p:pRg st="4" end="4"/>
+                                            </p:txEl>
+                                          </p:spTgt>
+                                        </p:tgtEl>
+                                      </p:cBhvr>
+                                    </p:animEffect>
+                                  </p:childTnLst>
+                                </p:cTn>
+                              </p:par>
+                            </p:childTnLst>
+                          </p:cTn>
+                        </p:par>
+                      </p:childTnLst>
+                    </p:cTn>
+                  </p:par>
+                  <p:par>
+                    <p:cTn id="16" fill="hold">
+                      <p:stCondLst>
+                        <p:cond delay="indefinite"/>
+                      </p:stCondLst>
+                      <p:childTnLst>
+                        <p:par>
+                          <p:cTn id="17" fill="hold">
+                            <p:stCondLst>
+                              <p:cond delay="0"/>
+                            </p:stCondLst>
+                            <p:childTnLst>
+                              <p:par>
+                                <p:cTn id="18" presetID="10" presetClass="entr" presetSubtype="0" fill="hold" nodeType="clickEffect">
+                                  <p:stCondLst>
+                                    <p:cond delay="0"/>
+                                  </p:stCondLst>
+                                  <p:childTnLst>
+                                    <p:set>
+                                      <p:cBhvr>
+                                        <p:cTn id="19" dur="1" fill="hold">
+                                          <p:stCondLst>
+                                            <p:cond delay="0"/>
+                                          </p:stCondLst>
+                                        </p:cTn>
+                                        <p:tgtEl>
+                                          <p:spTgt spid="3">
+                                            <p:txEl>
+                                              <p:pRg st="0" end="0"/>
+                                            </p:txEl>
+                                          </p:spTgt>
+                                        </p:tgtEl>
+                                        <p:attrNameLst>
+                                          <p:attrName>style.visibility</p:attrName>
+                                        </p:attrNameLst>
+                                      </p:cBhvr>
+                                      <p:to>
+                                        <p:strVal val="visible"/>
+                                      </p:to>
+                                    </p:set>
+                                    <p:animEffect transition="in" filter="fade">
+                                      <p:cBhvr>
+                                        <p:cTn id="20" dur="500"/>
+                                        <p:tgtEl>
+                                          <p:spTgt spid="3">
+                                            <p:txEl>
+                                              <p:pRg st="0" end="0"/>
+                                            </p:txEl>
+                                          </p:spTgt>
+                                        </p:tgtEl>
+                                      </p:cBhvr>
+                                    </p:animEffect>
+                                  </p:childTnLst>
+                                </p:cTn>
+                              </p:par>
+                            </p:childTnLst>
+                          </p:cTn>
+                        </p:par>
+                        <p:par>
+                          <p:cTn id="21" fill="hold">
+                            <p:stCondLst>
+                              <p:cond delay="500"/>
+                            </p:stCondLst>
+                            <p:childTnLst>
+                              <p:par>
+                                <p:cTn id="22" presetID="10" presetClass="entr" presetSubtype="0" fill="hold" nodeType="afterEffect">
+                                  <p:stCondLst>
+                                    <p:cond delay="0"/>
+                                  </p:stCondLst>
+                                  <p:childTnLst>
+                                    <p:set>
+                                      <p:cBhvr>
+                                        <p:cTn id="23" dur="1" fill="hold">
+                                          <p:stCondLst>
+                                            <p:cond delay="0"/>
+                                          </p:stCondLst>
+                                        </p:cTn>
+                                        <p:tgtEl>
+                                          <p:spTgt spid="3">
+                                            <p:txEl>
+                                              <p:pRg st="1" end="1"/>
+                                            </p:txEl>
+                                          </p:spTgt>
+                                        </p:tgtEl>
+                                        <p:attrNameLst>
+                                          <p:attrName>style.visibility</p:attrName>
+                                        </p:attrNameLst>
+                                      </p:cBhvr>
+                                      <p:to>
+                                        <p:strVal val="visible"/>
+                                      </p:to>
+                                    </p:set>
+                                    <p:animEffect transition="in" filter="fade">
+                                      <p:cBhvr>
+                                        <p:cTn id="24" dur="500"/>
+                                        <p:tgtEl>
+                                          <p:spTgt spid="3">
+                                            <p:txEl>
+                                              <p:pRg st="1" end="1"/>
+                                            </p:txEl>
+                                          </p:spTgt>
+                                        </p:tgtEl>
+                                      </p:cBhvr>
+                                    </p:animEffect>
+                                  </p:childTnLst>
+                                </p:cTn>
+                              </p:par>
+                            </p:childTnLst>
+                          </p:cTn>
+                        </p:par>
+                        <p:par>
+                          <p:cTn id="25" fill="hold">
+                            <p:stCondLst>
+                              <p:cond delay="1000"/>
+                            </p:stCondLst>
+                            <p:childTnLst>
+                              <p:par>
+                                <p:cTn id="26" presetID="10" presetClass="entr" presetSubtype="0" fill="hold" nodeType="afterEffect">
+                                  <p:stCondLst>
+                                    <p:cond delay="0"/>
+                                  </p:stCondLst>
+                                  <p:childTnLst>
+                                    <p:set>
+                                      <p:cBhvr>
+                                        <p:cTn id="27" dur="1" fill="hold">
+                                          <p:stCondLst>
+                                            <p:cond delay="0"/>
+                                          </p:stCondLst>
+                                        </p:cTn>
+                                        <p:tgtEl>
+                                          <p:spTgt spid="3">
+                                            <p:txEl>
+                                              <p:pRg st="3" end="3"/>
+                                            </p:txEl>
+                                          </p:spTgt>
+                                        </p:tgtEl>
+                                        <p:attrNameLst>
+                                          <p:attrName>style.visibility</p:attrName>
+                                        </p:attrNameLst>
+                                      </p:cBhvr>
+                                      <p:to>
+                                        <p:strVal val="visible"/>
+                                      </p:to>
+                                    </p:set>
+                                    <p:animEffect transition="in" filter="fade">
+                                      <p:cBhvr>
+                                        <p:cTn id="28" dur="500"/>
+                                        <p:tgtEl>
+                                          <p:spTgt spid="3">
+                                            <p:txEl>
+                                              <p:pRg st="3" end="3"/>
+                                            </p:txEl>
+                                          </p:spTgt>
+                                        </p:tgtEl>
+                                      </p:cBhvr>
+                                    </p:animEffect>
+                                  </p:childTnLst>
+                                </p:cTn>
+                              </p:par>
+                            </p:childTnLst>
+                          </p:cTn>
+                        </p:par>
+                        <p:par>
+                          <p:cTn id="29" fill="hold">
+                            <p:stCondLst>
+                              <p:cond delay="1500"/>
+                            </p:stCondLst>
+                            <p:childTnLst>
+                              <p:par>
+                                <p:cTn id="30" presetID="10" presetClass="entr" presetSubtype="0" fill="hold" nodeType="afterEffect">
+                                  <p:stCondLst>
+                                    <p:cond delay="0"/>
+                                  </p:stCondLst>
+                                  <p:childTnLst>
+                                    <p:set>
+                                      <p:cBhvr>
+                                        <p:cTn id="31" dur="1" fill="hold">
+                                          <p:stCondLst>
+                                            <p:cond delay="0"/>
+                                          </p:stCondLst>
+                                        </p:cTn>
+                                        <p:tgtEl>
+                                          <p:spTgt spid="3">
+                                            <p:txEl>
+                                              <p:pRg st="5" end="5"/>
+                                            </p:txEl>
+                                          </p:spTgt>
+                                        </p:tgtEl>
+                                        <p:attrNameLst>
+                                          <p:attrName>style.visibility</p:attrName>
+                                        </p:attrNameLst>
+                                      </p:cBhvr>
+                                      <p:to>
+                                        <p:strVal val="visible"/>
+                                      </p:to>
+                                    </p:set>
+                                    <p:animEffect transition="in" filter="fade">
+                                      <p:cBhvr>
+                                        <p:cTn id="32" dur="500"/>
+                                        <p:tgtEl>
+                                          <p:spTgt spid="3">
+                                            <p:txEl>
+                                              <p:pRg st="5" end="5"/>
+                                            </p:txEl>
+                                          </p:spTgt>
+                                        </p:tgtEl>
+                                      </p:cBhvr>
+                                    </p:animEffect>
+                                  </p:childTnLst>
+                                </p:cTn>
+                              </p:par>
+                            </p:childTnLst>
+                          </p:cTn>
+                        </p:par>
+                      </p:childTnLst>
+                    </p:cTn>
+                  </p:par>
+                </p:childTnLst>
+              </p:cTn>
+              <p:prevCondLst>
+                <p:cond evt="onPrev" delay="0">
+                  <p:tgtEl>
+                    <p:sldTgt/>
+                  </p:tgtEl>
+                </p:cond>
+              </p:prevCondLst>
+              <p:nextCondLst>
+                <p:cond evt="onNext" delay="0">
+                  <p:tgtEl>
+                    <p:sldTgt/>
+                  </p:tgtEl>
+                </p:cond>
+              </p:nextCondLst>
+            </p:seq>
+          </p:childTnLst>
+        </p:cTn>
+      </p:par>
+    </p:tnLst>
+    <p:bldLst>
+      <p:bldP spid="10" grpId="0" build="p"/>
+    </p:bldLst>
+  </p:timing>
+</p:sld>
+</file>
+
+<file path=ppt/slides/slide3.xml><?xml version="1.0" encoding="utf-8"?>
+<p:sld xmlns:a="http://schemas.openxmlformats.org/drawingml/2006/main" xmlns:r="http://schemas.openxmlformats.org/officeDocument/2006/relationships" xmlns:p="http://schemas.openxmlformats.org/presentationml/2006/main">
+  <p:cSld>
+    <p:bg>
+      <p:bgPr>
+        <a:solidFill>
+          <a:schemeClr val="bg1"/>
+        </a:solidFill>
+        <a:effectLst/>
+      </p:bgPr>
+    </p:bg>
+    <p:spTree>
+      <p:nvGrpSpPr>
+        <p:cNvPr id="1" name=""/>
+        <p:cNvGrpSpPr/>
+        <p:nvPr/>
+      </p:nvGrpSpPr>
+      <p:grpSpPr>
+        <a:xfrm>
+          <a:off x="0" y="0"/>
+          <a:ext cx="0" cy="0"/>
+          <a:chOff x="0" y="0"/>
+          <a:chExt cx="0" cy="0"/>
+        </a:xfrm>
+      </p:grpSpPr>
+      <p:sp>
+        <p:nvSpPr>
+          <p:cNvPr id="2" name="Título 1">
+            <a:extLst>
+              <a:ext uri="{FF2B5EF4-FFF2-40B4-BE49-F238E27FC236}">
+                <a16:creationId xmlns:a16="http://schemas.microsoft.com/office/drawing/2014/main" id="{C59C47E9-4F53-4D1A-AF58-04E6C5657EE1}"/>
+              </a:ext>
+            </a:extLst>
+          </p:cNvPr>
+          <p:cNvSpPr>
+            <a:spLocks noGrp="1"/>
+          </p:cNvSpPr>
+          <p:nvPr>
+            <p:ph type="title"/>
+          </p:nvPr>
+        </p:nvSpPr>
+        <p:spPr>
+          <a:xfrm>
+            <a:off x="676746" y="222223"/>
+            <a:ext cx="3729076" cy="1320800"/>
+          </a:xfrm>
+        </p:spPr>
+        <p:txBody>
+          <a:bodyPr anchor="ctr">
+            <a:normAutofit/>
+          </a:bodyPr>
+          <a:lstStyle/>
+          <a:p>
+            <a:r>
+              <a:rPr lang="en-US" dirty="0" err="1"/>
               <a:t>Qué</a:t>
             </a:r>
             <a:r>
@@ -7947,7 +9294,7 @@
     </p:spTree>
     <p:extLst>
       <p:ext uri="{BB962C8B-B14F-4D97-AF65-F5344CB8AC3E}">
-        <p14:creationId xmlns:p14="http://schemas.microsoft.com/office/powerpoint/2010/main" val="334522380"/>
+        <p14:creationId xmlns:p14="http://schemas.microsoft.com/office/powerpoint/2010/main" val="3456453799"/>
       </p:ext>
     </p:extLst>
   </p:cSld>
@@ -8231,7 +9578,7 @@
 </p:sld>
 </file>
 
-<file path=ppt/slides/slide3.xml><?xml version="1.0" encoding="utf-8"?>
+<file path=ppt/slides/slide4.xml><?xml version="1.0" encoding="utf-8"?>
 <p:sld xmlns:a="http://schemas.openxmlformats.org/drawingml/2006/main" xmlns:r="http://schemas.openxmlformats.org/officeDocument/2006/relationships" xmlns:p="http://schemas.openxmlformats.org/presentationml/2006/main">
   <p:cSld>
     <p:spTree>
@@ -8712,7 +10059,7 @@
 </p:sld>
 </file>
 
-<file path=ppt/slides/slide4.xml><?xml version="1.0" encoding="utf-8"?>
+<file path=ppt/slides/slide5.xml><?xml version="1.0" encoding="utf-8"?>
 <p:sld xmlns:a="http://schemas.openxmlformats.org/drawingml/2006/main" xmlns:r="http://schemas.openxmlformats.org/officeDocument/2006/relationships" xmlns:p="http://schemas.openxmlformats.org/presentationml/2006/main">
   <p:cSld>
     <p:spTree>
@@ -9545,7 +10892,7 @@
 </p:sld>
 </file>
 
-<file path=ppt/slides/slide5.xml><?xml version="1.0" encoding="utf-8"?>
+<file path=ppt/slides/slide6.xml><?xml version="1.0" encoding="utf-8"?>
 <p:sld xmlns:a="http://schemas.openxmlformats.org/drawingml/2006/main" xmlns:r="http://schemas.openxmlformats.org/officeDocument/2006/relationships" xmlns:p="http://schemas.openxmlformats.org/presentationml/2006/main" show="0">
   <p:cSld>
     <p:spTree>
@@ -9684,7 +11031,7 @@
 </p:sld>
 </file>
 
-<file path=ppt/slides/slide6.xml><?xml version="1.0" encoding="utf-8"?>
+<file path=ppt/slides/slide7.xml><?xml version="1.0" encoding="utf-8"?>
 <p:sld xmlns:a="http://schemas.openxmlformats.org/drawingml/2006/main" xmlns:r="http://schemas.openxmlformats.org/officeDocument/2006/relationships" xmlns:p="http://schemas.openxmlformats.org/presentationml/2006/main">
   <p:cSld>
     <p:spTree>
@@ -10271,71 +11618,6 @@
 </p:sld>
 </file>
 
-<file path=ppt/slides/slide7.xml><?xml version="1.0" encoding="utf-8"?>
-<p:sld xmlns:a="http://schemas.openxmlformats.org/drawingml/2006/main" xmlns:r="http://schemas.openxmlformats.org/officeDocument/2006/relationships" xmlns:p="http://schemas.openxmlformats.org/presentationml/2006/main">
-  <p:cSld>
-    <p:spTree>
-      <p:nvGrpSpPr>
-        <p:cNvPr id="1" name=""/>
-        <p:cNvGrpSpPr/>
-        <p:nvPr/>
-      </p:nvGrpSpPr>
-      <p:grpSpPr>
-        <a:xfrm>
-          <a:off x="0" y="0"/>
-          <a:ext cx="0" cy="0"/>
-          <a:chOff x="0" y="0"/>
-          <a:chExt cx="0" cy="0"/>
-        </a:xfrm>
-      </p:grpSpPr>
-      <p:sp>
-        <p:nvSpPr>
-          <p:cNvPr id="2" name="Título 1">
-            <a:extLst>
-              <a:ext uri="{FF2B5EF4-FFF2-40B4-BE49-F238E27FC236}">
-                <a16:creationId xmlns:a16="http://schemas.microsoft.com/office/drawing/2014/main" id="{93B427BE-506B-4827-8152-DC18665780F6}"/>
-              </a:ext>
-            </a:extLst>
-          </p:cNvPr>
-          <p:cNvSpPr>
-            <a:spLocks noGrp="1"/>
-          </p:cNvSpPr>
-          <p:nvPr>
-            <p:ph type="title"/>
-          </p:nvPr>
-        </p:nvSpPr>
-        <p:spPr>
-          <a:xfrm>
-            <a:off x="2871894" y="2768600"/>
-            <a:ext cx="8596668" cy="1320800"/>
-          </a:xfrm>
-        </p:spPr>
-        <p:txBody>
-          <a:bodyPr>
-            <a:normAutofit/>
-          </a:bodyPr>
-          <a:lstStyle/>
-          <a:p>
-            <a:r>
-              <a:rPr lang="es-ES" sz="6600" dirty="0"/>
-              <a:t>PLAY DEMO</a:t>
-            </a:r>
-          </a:p>
-        </p:txBody>
-      </p:sp>
-    </p:spTree>
-    <p:extLst>
-      <p:ext uri="{BB962C8B-B14F-4D97-AF65-F5344CB8AC3E}">
-        <p14:creationId xmlns:p14="http://schemas.microsoft.com/office/powerpoint/2010/main" val="1308246745"/>
-      </p:ext>
-    </p:extLst>
-  </p:cSld>
-  <p:clrMapOvr>
-    <a:masterClrMapping/>
-  </p:clrMapOvr>
-</p:sld>
-</file>
-
 <file path=ppt/slides/slide8.xml><?xml version="1.0" encoding="utf-8"?>
 <p:sld xmlns:a="http://schemas.openxmlformats.org/drawingml/2006/main" xmlns:r="http://schemas.openxmlformats.org/officeDocument/2006/relationships" xmlns:p="http://schemas.openxmlformats.org/presentationml/2006/main">
   <p:cSld>
@@ -10358,7 +11640,7 @@
           <p:cNvPr id="2" name="Título 1">
             <a:extLst>
               <a:ext uri="{FF2B5EF4-FFF2-40B4-BE49-F238E27FC236}">
-                <a16:creationId xmlns:a16="http://schemas.microsoft.com/office/drawing/2014/main" id="{C59C47E9-4F53-4D1A-AF58-04E6C5657EE1}"/>
+                <a16:creationId xmlns:a16="http://schemas.microsoft.com/office/drawing/2014/main" id="{93B427BE-506B-4827-8152-DC18665780F6}"/>
               </a:ext>
             </a:extLst>
           </p:cNvPr>
@@ -10371,41 +11653,211 @@
         </p:nvSpPr>
         <p:spPr>
           <a:xfrm>
-            <a:off x="1579033" y="787400"/>
-            <a:ext cx="9033933" cy="4199466"/>
+            <a:off x="2871894" y="2768600"/>
+            <a:ext cx="8596668" cy="1320800"/>
           </a:xfrm>
         </p:spPr>
         <p:txBody>
           <a:bodyPr>
-            <a:noAutofit/>
+            <a:normAutofit/>
           </a:bodyPr>
           <a:lstStyle/>
           <a:p>
-            <a:pPr algn="ctr"/>
-            <a:br>
-              <a:rPr lang="es-ES" sz="9600" dirty="0"/>
-            </a:br>
-            <a:r>
-              <a:rPr lang="es-ES" sz="8800" dirty="0">
-                <a:solidFill>
-                  <a:schemeClr val="accent1">
-                    <a:lumMod val="50000"/>
-                  </a:schemeClr>
-                </a:solidFill>
-              </a:rPr>
-              <a:t>Muchas gracias</a:t>
-            </a:r>
-            <a:br>
-              <a:rPr lang="es-ES" sz="9600" dirty="0"/>
-            </a:br>
-            <a:endParaRPr lang="es-ES" sz="9600" i="1" dirty="0"/>
+            <a:r>
+              <a:rPr lang="es-ES" sz="6600" dirty="0"/>
+              <a:t>PLAY DEMO</a:t>
+            </a:r>
           </a:p>
         </p:txBody>
       </p:sp>
     </p:spTree>
     <p:extLst>
       <p:ext uri="{BB962C8B-B14F-4D97-AF65-F5344CB8AC3E}">
-        <p14:creationId xmlns:p14="http://schemas.microsoft.com/office/powerpoint/2010/main" val="2834538423"/>
+        <p14:creationId xmlns:p14="http://schemas.microsoft.com/office/powerpoint/2010/main" val="1308246745"/>
+      </p:ext>
+    </p:extLst>
+  </p:cSld>
+  <p:clrMapOvr>
+    <a:masterClrMapping/>
+  </p:clrMapOvr>
+</p:sld>
+</file>
+
+<file path=ppt/slides/slide9.xml><?xml version="1.0" encoding="utf-8"?>
+<p:sld xmlns:a="http://schemas.openxmlformats.org/drawingml/2006/main" xmlns:r="http://schemas.openxmlformats.org/officeDocument/2006/relationships" xmlns:p="http://schemas.openxmlformats.org/presentationml/2006/main">
+  <p:cSld>
+    <p:spTree>
+      <p:nvGrpSpPr>
+        <p:cNvPr id="1" name=""/>
+        <p:cNvGrpSpPr/>
+        <p:nvPr/>
+      </p:nvGrpSpPr>
+      <p:grpSpPr>
+        <a:xfrm>
+          <a:off x="0" y="0"/>
+          <a:ext cx="0" cy="0"/>
+          <a:chOff x="0" y="0"/>
+          <a:chExt cx="0" cy="0"/>
+        </a:xfrm>
+      </p:grpSpPr>
+      <p:sp>
+        <p:nvSpPr>
+          <p:cNvPr id="2" name="Título 1">
+            <a:extLst>
+              <a:ext uri="{FF2B5EF4-FFF2-40B4-BE49-F238E27FC236}">
+                <a16:creationId xmlns:a16="http://schemas.microsoft.com/office/drawing/2014/main" id="{2B5EEE0E-E97B-4AD1-9BF3-61E792098F43}"/>
+              </a:ext>
+            </a:extLst>
+          </p:cNvPr>
+          <p:cNvSpPr>
+            <a:spLocks noGrp="1"/>
+          </p:cNvSpPr>
+          <p:nvPr>
+            <p:ph type="title"/>
+          </p:nvPr>
+        </p:nvSpPr>
+        <p:spPr/>
+        <p:txBody>
+          <a:bodyPr/>
+          <a:lstStyle/>
+          <a:p>
+            <a:r>
+              <a:rPr lang="es-ES" dirty="0"/>
+              <a:t>Conclusiones</a:t>
+            </a:r>
+          </a:p>
+        </p:txBody>
+      </p:sp>
+      <p:sp>
+        <p:nvSpPr>
+          <p:cNvPr id="3" name="Marcador de contenido 2">
+            <a:extLst>
+              <a:ext uri="{FF2B5EF4-FFF2-40B4-BE49-F238E27FC236}">
+                <a16:creationId xmlns:a16="http://schemas.microsoft.com/office/drawing/2014/main" id="{1906C13B-DC8B-4E38-A1DE-636CA63BB3D7}"/>
+              </a:ext>
+            </a:extLst>
+          </p:cNvPr>
+          <p:cNvSpPr>
+            <a:spLocks noGrp="1"/>
+          </p:cNvSpPr>
+          <p:nvPr>
+            <p:ph idx="1"/>
+          </p:nvPr>
+        </p:nvSpPr>
+        <p:spPr>
+          <a:xfrm>
+            <a:off x="677334" y="1422400"/>
+            <a:ext cx="9226687" cy="5435599"/>
+          </a:xfrm>
+        </p:spPr>
+        <p:txBody>
+          <a:bodyPr>
+            <a:normAutofit lnSpcReduction="10000"/>
+          </a:bodyPr>
+          <a:lstStyle/>
+          <a:p>
+            <a:r>
+              <a:rPr lang="es-ES" sz="2800" dirty="0"/>
+              <a:t>Es una herramienta </a:t>
+            </a:r>
+            <a:r>
+              <a:rPr lang="es-ES" sz="2800" b="1" dirty="0"/>
+              <a:t>muy potente </a:t>
+            </a:r>
+            <a:r>
+              <a:rPr lang="es-ES" sz="2800" dirty="0"/>
+              <a:t>e </a:t>
+            </a:r>
+            <a:r>
+              <a:rPr lang="es-ES" sz="2800" b="1" dirty="0"/>
+              <a:t>interesante</a:t>
+            </a:r>
+            <a:r>
+              <a:rPr lang="es-ES" sz="2800" dirty="0"/>
+              <a:t> de probar</a:t>
+            </a:r>
+          </a:p>
+          <a:p>
+            <a:endParaRPr lang="es-ES" sz="2800" dirty="0"/>
+          </a:p>
+          <a:p>
+            <a:r>
+              <a:rPr lang="es-ES" sz="2800" dirty="0"/>
+              <a:t>Nos proporciona información en </a:t>
+            </a:r>
+            <a:r>
+              <a:rPr lang="es-ES" sz="2800" b="1" dirty="0"/>
+              <a:t>grandes cantidades </a:t>
+            </a:r>
+            <a:r>
+              <a:rPr lang="es-ES" sz="2800" dirty="0"/>
+              <a:t>y de </a:t>
+            </a:r>
+            <a:r>
+              <a:rPr lang="es-ES" sz="2800" b="1" dirty="0"/>
+              <a:t>calidad</a:t>
+            </a:r>
+          </a:p>
+          <a:p>
+            <a:endParaRPr lang="es-ES" sz="2800" dirty="0"/>
+          </a:p>
+          <a:p>
+            <a:r>
+              <a:rPr lang="es-ES" sz="2800" dirty="0"/>
+              <a:t>Muy útil tanto para realizar </a:t>
+            </a:r>
+            <a:r>
+              <a:rPr lang="es-ES" sz="2800" b="1" dirty="0"/>
+              <a:t>auditorias</a:t>
+            </a:r>
+            <a:r>
+              <a:rPr lang="es-ES" sz="2800" dirty="0"/>
+              <a:t> sobre sistemas como para buscar dispositivos </a:t>
+            </a:r>
+            <a:r>
+              <a:rPr lang="es-ES" sz="2800" b="1" dirty="0"/>
+              <a:t>vulnerables</a:t>
+            </a:r>
+            <a:r>
+              <a:rPr lang="es-ES" sz="2800" dirty="0"/>
+              <a:t> </a:t>
+            </a:r>
+          </a:p>
+          <a:p>
+            <a:endParaRPr lang="es-ES" sz="2800" dirty="0"/>
+          </a:p>
+          <a:p>
+            <a:r>
+              <a:rPr lang="es-ES" sz="2800" dirty="0"/>
+              <a:t>Obligatorio hacer </a:t>
+            </a:r>
+            <a:r>
+              <a:rPr lang="es-ES" sz="2800" b="1" dirty="0" err="1"/>
+              <a:t>upgrade</a:t>
+            </a:r>
+            <a:r>
+              <a:rPr lang="es-ES" sz="2800" dirty="0"/>
+              <a:t> de cuenta para sacarle el máximo partido</a:t>
+            </a:r>
+          </a:p>
+          <a:p>
+            <a:endParaRPr lang="es-ES" sz="2800" dirty="0"/>
+          </a:p>
+          <a:p>
+            <a:endParaRPr lang="es-ES" sz="2800" dirty="0"/>
+          </a:p>
+          <a:p>
+            <a:endParaRPr lang="es-ES" dirty="0"/>
+          </a:p>
+          <a:p>
+            <a:endParaRPr lang="es-ES" dirty="0"/>
+          </a:p>
+        </p:txBody>
+      </p:sp>
+    </p:spTree>
+    <p:extLst>
+      <p:ext uri="{BB962C8B-B14F-4D97-AF65-F5344CB8AC3E}">
+        <p14:creationId xmlns:p14="http://schemas.microsoft.com/office/powerpoint/2010/main" val="2082484792"/>
       </p:ext>
     </p:extLst>
   </p:cSld>
@@ -10424,9 +11876,6 @@
                     <p:cTn id="3" fill="hold">
                       <p:stCondLst>
                         <p:cond delay="indefinite"/>
-                        <p:cond evt="onBegin" delay="0">
-                          <p:tn val="2"/>
-                        </p:cond>
                       </p:stCondLst>
                       <p:childTnLst>
                         <p:par>
@@ -10436,7 +11885,7 @@
                             </p:stCondLst>
                             <p:childTnLst>
                               <p:par>
-                                <p:cTn id="5" presetID="10" presetClass="entr" presetSubtype="0" fill="hold" grpId="0" nodeType="withEffect">
+                                <p:cTn id="5" presetID="10" presetClass="entr" presetSubtype="0" fill="hold" nodeType="clickEffect">
                                   <p:stCondLst>
                                     <p:cond delay="0"/>
                                   </p:stCondLst>
@@ -10449,7 +11898,11 @@
                                           </p:stCondLst>
                                         </p:cTn>
                                         <p:tgtEl>
-                                          <p:spTgt spid="2"/>
+                                          <p:spTgt spid="3">
+                                            <p:txEl>
+                                              <p:pRg st="0" end="0"/>
+                                            </p:txEl>
+                                          </p:spTgt>
                                         </p:tgtEl>
                                         <p:attrNameLst>
                                           <p:attrName>style.visibility</p:attrName>
@@ -10463,7 +11916,194 @@
                                       <p:cBhvr>
                                         <p:cTn id="7" dur="500"/>
                                         <p:tgtEl>
-                                          <p:spTgt spid="2"/>
+                                          <p:spTgt spid="3">
+                                            <p:txEl>
+                                              <p:pRg st="0" end="0"/>
+                                            </p:txEl>
+                                          </p:spTgt>
+                                        </p:tgtEl>
+                                      </p:cBhvr>
+                                    </p:animEffect>
+                                  </p:childTnLst>
+                                </p:cTn>
+                              </p:par>
+                            </p:childTnLst>
+                          </p:cTn>
+                        </p:par>
+                      </p:childTnLst>
+                    </p:cTn>
+                  </p:par>
+                  <p:par>
+                    <p:cTn id="8" fill="hold">
+                      <p:stCondLst>
+                        <p:cond delay="indefinite"/>
+                      </p:stCondLst>
+                      <p:childTnLst>
+                        <p:par>
+                          <p:cTn id="9" fill="hold">
+                            <p:stCondLst>
+                              <p:cond delay="0"/>
+                            </p:stCondLst>
+                            <p:childTnLst>
+                              <p:par>
+                                <p:cTn id="10" presetID="10" presetClass="entr" presetSubtype="0" fill="hold" nodeType="clickEffect">
+                                  <p:stCondLst>
+                                    <p:cond delay="0"/>
+                                  </p:stCondLst>
+                                  <p:childTnLst>
+                                    <p:set>
+                                      <p:cBhvr>
+                                        <p:cTn id="11" dur="1" fill="hold">
+                                          <p:stCondLst>
+                                            <p:cond delay="0"/>
+                                          </p:stCondLst>
+                                        </p:cTn>
+                                        <p:tgtEl>
+                                          <p:spTgt spid="3">
+                                            <p:txEl>
+                                              <p:pRg st="2" end="2"/>
+                                            </p:txEl>
+                                          </p:spTgt>
+                                        </p:tgtEl>
+                                        <p:attrNameLst>
+                                          <p:attrName>style.visibility</p:attrName>
+                                        </p:attrNameLst>
+                                      </p:cBhvr>
+                                      <p:to>
+                                        <p:strVal val="visible"/>
+                                      </p:to>
+                                    </p:set>
+                                    <p:animEffect transition="in" filter="fade">
+                                      <p:cBhvr>
+                                        <p:cTn id="12" dur="500"/>
+                                        <p:tgtEl>
+                                          <p:spTgt spid="3">
+                                            <p:txEl>
+                                              <p:pRg st="2" end="2"/>
+                                            </p:txEl>
+                                          </p:spTgt>
+                                        </p:tgtEl>
+                                      </p:cBhvr>
+                                    </p:animEffect>
+                                  </p:childTnLst>
+                                </p:cTn>
+                              </p:par>
+                            </p:childTnLst>
+                          </p:cTn>
+                        </p:par>
+                      </p:childTnLst>
+                    </p:cTn>
+                  </p:par>
+                  <p:par>
+                    <p:cTn id="13" fill="hold">
+                      <p:stCondLst>
+                        <p:cond delay="indefinite"/>
+                      </p:stCondLst>
+                      <p:childTnLst>
+                        <p:par>
+                          <p:cTn id="14" fill="hold">
+                            <p:stCondLst>
+                              <p:cond delay="0"/>
+                            </p:stCondLst>
+                            <p:childTnLst>
+                              <p:par>
+                                <p:cTn id="15" presetID="10" presetClass="entr" presetSubtype="0" fill="hold" nodeType="clickEffect">
+                                  <p:stCondLst>
+                                    <p:cond delay="0"/>
+                                  </p:stCondLst>
+                                  <p:childTnLst>
+                                    <p:set>
+                                      <p:cBhvr>
+                                        <p:cTn id="16" dur="1" fill="hold">
+                                          <p:stCondLst>
+                                            <p:cond delay="0"/>
+                                          </p:stCondLst>
+                                        </p:cTn>
+                                        <p:tgtEl>
+                                          <p:spTgt spid="3">
+                                            <p:txEl>
+                                              <p:pRg st="4" end="4"/>
+                                            </p:txEl>
+                                          </p:spTgt>
+                                        </p:tgtEl>
+                                        <p:attrNameLst>
+                                          <p:attrName>style.visibility</p:attrName>
+                                        </p:attrNameLst>
+                                      </p:cBhvr>
+                                      <p:to>
+                                        <p:strVal val="visible"/>
+                                      </p:to>
+                                    </p:set>
+                                    <p:animEffect transition="in" filter="fade">
+                                      <p:cBhvr>
+                                        <p:cTn id="17" dur="500"/>
+                                        <p:tgtEl>
+                                          <p:spTgt spid="3">
+                                            <p:txEl>
+                                              <p:pRg st="4" end="4"/>
+                                            </p:txEl>
+                                          </p:spTgt>
+                                        </p:tgtEl>
+                                      </p:cBhvr>
+                                    </p:animEffect>
+                                  </p:childTnLst>
+                                </p:cTn>
+                              </p:par>
+                            </p:childTnLst>
+                          </p:cTn>
+                        </p:par>
+                      </p:childTnLst>
+                    </p:cTn>
+                  </p:par>
+                  <p:par>
+                    <p:cTn id="18" fill="hold">
+                      <p:stCondLst>
+                        <p:cond delay="indefinite"/>
+                      </p:stCondLst>
+                      <p:childTnLst>
+                        <p:par>
+                          <p:cTn id="19" fill="hold">
+                            <p:stCondLst>
+                              <p:cond delay="0"/>
+                            </p:stCondLst>
+                            <p:childTnLst>
+                              <p:par>
+                                <p:cTn id="20" presetID="10" presetClass="entr" presetSubtype="0" fill="hold" nodeType="clickEffect">
+                                  <p:stCondLst>
+                                    <p:cond delay="0"/>
+                                  </p:stCondLst>
+                                  <p:childTnLst>
+                                    <p:set>
+                                      <p:cBhvr>
+                                        <p:cTn id="21" dur="1" fill="hold">
+                                          <p:stCondLst>
+                                            <p:cond delay="0"/>
+                                          </p:stCondLst>
+                                        </p:cTn>
+                                        <p:tgtEl>
+                                          <p:spTgt spid="3">
+                                            <p:txEl>
+                                              <p:pRg st="6" end="6"/>
+                                            </p:txEl>
+                                          </p:spTgt>
+                                        </p:tgtEl>
+                                        <p:attrNameLst>
+                                          <p:attrName>style.visibility</p:attrName>
+                                        </p:attrNameLst>
+                                      </p:cBhvr>
+                                      <p:to>
+                                        <p:strVal val="visible"/>
+                                      </p:to>
+                                    </p:set>
+                                    <p:animEffect transition="in" filter="fade">
+                                      <p:cBhvr>
+                                        <p:cTn id="22" dur="500"/>
+                                        <p:tgtEl>
+                                          <p:spTgt spid="3">
+                                            <p:txEl>
+                                              <p:pRg st="6" end="6"/>
+                                            </p:txEl>
+                                          </p:spTgt>
                                         </p:tgtEl>
                                       </p:cBhvr>
                                     </p:animEffect>
@@ -10497,9 +12137,6 @@
         </p:cTn>
       </p:par>
     </p:tnLst>
-    <p:bldLst>
-      <p:bldP spid="2" grpId="0"/>
-    </p:bldLst>
   </p:timing>
 </p:sld>
 </file>

</xml_diff>